<commit_message>
Actualización 11052021 y ejercicios
</commit_message>
<xml_diff>
--- a/week4_EDA_np_pd_json_apis_regex/day5_matplotlib_I_api/theory/apis/Python - Webs - APIs.pptx
+++ b/week4_EDA_np_pd_json_apis_regex/day5_matplotlib_I_api/theory/apis/Python - Webs - APIs.pptx
@@ -257,7 +257,7 @@
           <a:p>
             <a:fld id="{792B3CC7-5934-41B3-9FF0-D183E97580A1}" type="datetimeFigureOut">
               <a:rPr lang="es-ES" smtClean="0"/>
-              <a:t>09/05/2021</a:t>
+              <a:t>10/05/2021</a:t>
             </a:fld>
             <a:endParaRPr lang="es-ES"/>
           </a:p>
@@ -427,7 +427,7 @@
           <a:p>
             <a:fld id="{792B3CC7-5934-41B3-9FF0-D183E97580A1}" type="datetimeFigureOut">
               <a:rPr lang="es-ES" smtClean="0"/>
-              <a:t>09/05/2021</a:t>
+              <a:t>10/05/2021</a:t>
             </a:fld>
             <a:endParaRPr lang="es-ES"/>
           </a:p>
@@ -607,7 +607,7 @@
           <a:p>
             <a:fld id="{792B3CC7-5934-41B3-9FF0-D183E97580A1}" type="datetimeFigureOut">
               <a:rPr lang="es-ES" smtClean="0"/>
-              <a:t>09/05/2021</a:t>
+              <a:t>10/05/2021</a:t>
             </a:fld>
             <a:endParaRPr lang="es-ES"/>
           </a:p>
@@ -777,7 +777,7 @@
           <a:p>
             <a:fld id="{792B3CC7-5934-41B3-9FF0-D183E97580A1}" type="datetimeFigureOut">
               <a:rPr lang="es-ES" smtClean="0"/>
-              <a:t>09/05/2021</a:t>
+              <a:t>10/05/2021</a:t>
             </a:fld>
             <a:endParaRPr lang="es-ES"/>
           </a:p>
@@ -1023,7 +1023,7 @@
           <a:p>
             <a:fld id="{792B3CC7-5934-41B3-9FF0-D183E97580A1}" type="datetimeFigureOut">
               <a:rPr lang="es-ES" smtClean="0"/>
-              <a:t>09/05/2021</a:t>
+              <a:t>10/05/2021</a:t>
             </a:fld>
             <a:endParaRPr lang="es-ES"/>
           </a:p>
@@ -1255,7 +1255,7 @@
           <a:p>
             <a:fld id="{792B3CC7-5934-41B3-9FF0-D183E97580A1}" type="datetimeFigureOut">
               <a:rPr lang="es-ES" smtClean="0"/>
-              <a:t>09/05/2021</a:t>
+              <a:t>10/05/2021</a:t>
             </a:fld>
             <a:endParaRPr lang="es-ES"/>
           </a:p>
@@ -1622,7 +1622,7 @@
           <a:p>
             <a:fld id="{792B3CC7-5934-41B3-9FF0-D183E97580A1}" type="datetimeFigureOut">
               <a:rPr lang="es-ES" smtClean="0"/>
-              <a:t>09/05/2021</a:t>
+              <a:t>10/05/2021</a:t>
             </a:fld>
             <a:endParaRPr lang="es-ES"/>
           </a:p>
@@ -1740,7 +1740,7 @@
           <a:p>
             <a:fld id="{792B3CC7-5934-41B3-9FF0-D183E97580A1}" type="datetimeFigureOut">
               <a:rPr lang="es-ES" smtClean="0"/>
-              <a:t>09/05/2021</a:t>
+              <a:t>10/05/2021</a:t>
             </a:fld>
             <a:endParaRPr lang="es-ES"/>
           </a:p>
@@ -1835,7 +1835,7 @@
           <a:p>
             <a:fld id="{792B3CC7-5934-41B3-9FF0-D183E97580A1}" type="datetimeFigureOut">
               <a:rPr lang="es-ES" smtClean="0"/>
-              <a:t>09/05/2021</a:t>
+              <a:t>10/05/2021</a:t>
             </a:fld>
             <a:endParaRPr lang="es-ES"/>
           </a:p>
@@ -2112,7 +2112,7 @@
           <a:p>
             <a:fld id="{792B3CC7-5934-41B3-9FF0-D183E97580A1}" type="datetimeFigureOut">
               <a:rPr lang="es-ES" smtClean="0"/>
-              <a:t>09/05/2021</a:t>
+              <a:t>10/05/2021</a:t>
             </a:fld>
             <a:endParaRPr lang="es-ES"/>
           </a:p>
@@ -2369,7 +2369,7 @@
           <a:p>
             <a:fld id="{792B3CC7-5934-41B3-9FF0-D183E97580A1}" type="datetimeFigureOut">
               <a:rPr lang="es-ES" smtClean="0"/>
-              <a:t>09/05/2021</a:t>
+              <a:t>10/05/2021</a:t>
             </a:fld>
             <a:endParaRPr lang="es-ES"/>
           </a:p>
@@ -2582,7 +2582,7 @@
           <a:p>
             <a:fld id="{792B3CC7-5934-41B3-9FF0-D183E97580A1}" type="datetimeFigureOut">
               <a:rPr lang="es-ES" smtClean="0"/>
-              <a:t>09/05/2021</a:t>
+              <a:t>10/05/2021</a:t>
             </a:fld>
             <a:endParaRPr lang="es-ES"/>
           </a:p>

</xml_diff>